<commit_message>
Testing additions and Scaffolding
</commit_message>
<xml_diff>
--- a/pptx/7-13-2023-CoT.pptx
+++ b/pptx/7-13-2023-CoT.pptx
@@ -113,6 +113,11 @@
       </a:defRPr>
     </a:lvl9pPr>
   </p:defaultTextStyle>
+  <p:extLst>
+    <p:ext uri="{EFAFB233-063F-42B5-8137-9DF3F51BA10A}">
+      <p15:sldGuideLst xmlns:p15="http://schemas.microsoft.com/office/powerpoint/2012/main"/>
+    </p:ext>
+  </p:extLst>
 </p:presentation>
 </file>
 
@@ -263,7 +268,7 @@
           <a:p>
             <a:fld id="{F7842B2E-8DDA-9C43-995D-9B6DF5138199}" type="datetimeFigureOut">
               <a:rPr lang="en-US" smtClean="0"/>
-              <a:t>7/11/23</a:t>
+              <a:t>7/21/23</a:t>
             </a:fld>
             <a:endParaRPr lang="en-US"/>
           </a:p>
@@ -461,7 +466,7 @@
           <a:p>
             <a:fld id="{F7842B2E-8DDA-9C43-995D-9B6DF5138199}" type="datetimeFigureOut">
               <a:rPr lang="en-US" smtClean="0"/>
-              <a:t>7/11/23</a:t>
+              <a:t>7/21/23</a:t>
             </a:fld>
             <a:endParaRPr lang="en-US"/>
           </a:p>
@@ -669,7 +674,7 @@
           <a:p>
             <a:fld id="{F7842B2E-8DDA-9C43-995D-9B6DF5138199}" type="datetimeFigureOut">
               <a:rPr lang="en-US" smtClean="0"/>
-              <a:t>7/11/23</a:t>
+              <a:t>7/21/23</a:t>
             </a:fld>
             <a:endParaRPr lang="en-US"/>
           </a:p>
@@ -867,7 +872,7 @@
           <a:p>
             <a:fld id="{F7842B2E-8DDA-9C43-995D-9B6DF5138199}" type="datetimeFigureOut">
               <a:rPr lang="en-US" smtClean="0"/>
-              <a:t>7/11/23</a:t>
+              <a:t>7/21/23</a:t>
             </a:fld>
             <a:endParaRPr lang="en-US"/>
           </a:p>
@@ -1142,7 +1147,7 @@
           <a:p>
             <a:fld id="{F7842B2E-8DDA-9C43-995D-9B6DF5138199}" type="datetimeFigureOut">
               <a:rPr lang="en-US" smtClean="0"/>
-              <a:t>7/11/23</a:t>
+              <a:t>7/21/23</a:t>
             </a:fld>
             <a:endParaRPr lang="en-US"/>
           </a:p>
@@ -1407,7 +1412,7 @@
           <a:p>
             <a:fld id="{F7842B2E-8DDA-9C43-995D-9B6DF5138199}" type="datetimeFigureOut">
               <a:rPr lang="en-US" smtClean="0"/>
-              <a:t>7/11/23</a:t>
+              <a:t>7/21/23</a:t>
             </a:fld>
             <a:endParaRPr lang="en-US"/>
           </a:p>
@@ -1819,7 +1824,7 @@
           <a:p>
             <a:fld id="{F7842B2E-8DDA-9C43-995D-9B6DF5138199}" type="datetimeFigureOut">
               <a:rPr lang="en-US" smtClean="0"/>
-              <a:t>7/11/23</a:t>
+              <a:t>7/21/23</a:t>
             </a:fld>
             <a:endParaRPr lang="en-US"/>
           </a:p>
@@ -1960,7 +1965,7 @@
           <a:p>
             <a:fld id="{F7842B2E-8DDA-9C43-995D-9B6DF5138199}" type="datetimeFigureOut">
               <a:rPr lang="en-US" smtClean="0"/>
-              <a:t>7/11/23</a:t>
+              <a:t>7/21/23</a:t>
             </a:fld>
             <a:endParaRPr lang="en-US"/>
           </a:p>
@@ -2073,7 +2078,7 @@
           <a:p>
             <a:fld id="{F7842B2E-8DDA-9C43-995D-9B6DF5138199}" type="datetimeFigureOut">
               <a:rPr lang="en-US" smtClean="0"/>
-              <a:t>7/11/23</a:t>
+              <a:t>7/21/23</a:t>
             </a:fld>
             <a:endParaRPr lang="en-US"/>
           </a:p>
@@ -2384,7 +2389,7 @@
           <a:p>
             <a:fld id="{F7842B2E-8DDA-9C43-995D-9B6DF5138199}" type="datetimeFigureOut">
               <a:rPr lang="en-US" smtClean="0"/>
-              <a:t>7/11/23</a:t>
+              <a:t>7/21/23</a:t>
             </a:fld>
             <a:endParaRPr lang="en-US"/>
           </a:p>
@@ -2672,7 +2677,7 @@
           <a:p>
             <a:fld id="{F7842B2E-8DDA-9C43-995D-9B6DF5138199}" type="datetimeFigureOut">
               <a:rPr lang="en-US" smtClean="0"/>
-              <a:t>7/11/23</a:t>
+              <a:t>7/21/23</a:t>
             </a:fld>
             <a:endParaRPr lang="en-US"/>
           </a:p>
@@ -2913,7 +2918,7 @@
           <a:p>
             <a:fld id="{F7842B2E-8DDA-9C43-995D-9B6DF5138199}" type="datetimeFigureOut">
               <a:rPr lang="en-US" smtClean="0"/>
-              <a:t>7/11/23</a:t>
+              <a:t>7/21/23</a:t>
             </a:fld>
             <a:endParaRPr lang="en-US"/>
           </a:p>
@@ -3506,7 +3511,7 @@
           <a:p>
             <a:r>
               <a:rPr lang="en-US" dirty="0"/>
-              <a:t>Ask is it a LEF? -&gt; Can use ICL w/ yes or no with samples that aren’t LEF too</a:t>
+              <a:t>Ask is it a LEF? -&gt; Can use ICL w/ yes or no with samples that aren’t LEF too (1)</a:t>
             </a:r>
           </a:p>
           <a:p>
@@ -3526,18 +3531,13 @@
           <a:p>
             <a:r>
               <a:rPr lang="en-US" dirty="0"/>
-              <a:t>Use Scaffold </a:t>
-            </a:r>
-            <a:r>
-              <a:rPr lang="en-US"/>
-              <a:t>Similarity (4)</a:t>
-            </a:r>
-            <a:endParaRPr lang="en-US" dirty="0"/>
+              <a:t>Use Scaffold Similarity (0)</a:t>
+            </a:r>
           </a:p>
           <a:p>
             <a:r>
               <a:rPr lang="en-US" dirty="0"/>
-              <a:t>Can use intermediate1 and generate int + product vs just product alone. (1)</a:t>
+              <a:t>Can use intermediate1 and generate int + product vs just product alone. (2)</a:t>
             </a:r>
           </a:p>
           <a:p>

</xml_diff>